<commit_message>
Revert "Revert "no message""
This reverts commit 6f97b90c7a93c7b2cbfbf4145a6c9216d98d1990.
</commit_message>
<xml_diff>
--- a/Microsoft PowerPoint-Präsentation (neu).pptx
+++ b/Microsoft PowerPoint-Präsentation (neu).pptx
@@ -104,6 +104,11 @@
       </a:defRPr>
     </a:lvl9pPr>
   </p:defaultTextStyle>
+  <p:extLst>
+    <p:ext uri="{EFAFB233-063F-42B5-8137-9DF3F51BA10A}">
+      <p15:sldGuideLst xmlns:p15="http://schemas.microsoft.com/office/powerpoint/2012/main"/>
+    </p:ext>
+  </p:extLst>
 </p:presentation>
 </file>
 
@@ -3399,7 +3404,7 @@
         </p:blipFill>
         <p:spPr>
           <a:xfrm>
-            <a:off x="3469417" y="173038"/>
+            <a:off x="3469417" y="0"/>
             <a:ext cx="4988123" cy="6858000"/>
           </a:xfrm>
           <a:prstGeom prst="rect">

</xml_diff>